<commit_message>
fixed title slide type
</commit_message>
<xml_diff>
--- a/docs/lecture_slides/Week 6/Week6_Lecture12_Slides_2_16_2024.pptx
+++ b/docs/lecture_slides/Week 6/Week6_Lecture12_Slides_2_16_2024.pptx
@@ -3101,7 +3101,7 @@
           <a:p>
             <a:fld id="{16242ECF-4EC5-4F6F-92F2-C9C58BEB3FE8}" type="datetimeFigureOut">
               <a:rPr lang="en-US" smtClean="0"/>
-              <a:t>2/15/2024</a:t>
+              <a:t>2/16/2024</a:t>
             </a:fld>
             <a:endParaRPr lang="en-US"/>
           </a:p>
@@ -3299,7 +3299,7 @@
           <a:p>
             <a:fld id="{16242ECF-4EC5-4F6F-92F2-C9C58BEB3FE8}" type="datetimeFigureOut">
               <a:rPr lang="en-US" smtClean="0"/>
-              <a:t>2/15/2024</a:t>
+              <a:t>2/16/2024</a:t>
             </a:fld>
             <a:endParaRPr lang="en-US"/>
           </a:p>
@@ -3507,7 +3507,7 @@
           <a:p>
             <a:fld id="{16242ECF-4EC5-4F6F-92F2-C9C58BEB3FE8}" type="datetimeFigureOut">
               <a:rPr lang="en-US" smtClean="0"/>
-              <a:t>2/15/2024</a:t>
+              <a:t>2/16/2024</a:t>
             </a:fld>
             <a:endParaRPr lang="en-US"/>
           </a:p>
@@ -3705,7 +3705,7 @@
           <a:p>
             <a:fld id="{16242ECF-4EC5-4F6F-92F2-C9C58BEB3FE8}" type="datetimeFigureOut">
               <a:rPr lang="en-US" smtClean="0"/>
-              <a:t>2/15/2024</a:t>
+              <a:t>2/16/2024</a:t>
             </a:fld>
             <a:endParaRPr lang="en-US"/>
           </a:p>
@@ -3980,7 +3980,7 @@
           <a:p>
             <a:fld id="{16242ECF-4EC5-4F6F-92F2-C9C58BEB3FE8}" type="datetimeFigureOut">
               <a:rPr lang="en-US" smtClean="0"/>
-              <a:t>2/15/2024</a:t>
+              <a:t>2/16/2024</a:t>
             </a:fld>
             <a:endParaRPr lang="en-US"/>
           </a:p>
@@ -4245,7 +4245,7 @@
           <a:p>
             <a:fld id="{16242ECF-4EC5-4F6F-92F2-C9C58BEB3FE8}" type="datetimeFigureOut">
               <a:rPr lang="en-US" smtClean="0"/>
-              <a:t>2/15/2024</a:t>
+              <a:t>2/16/2024</a:t>
             </a:fld>
             <a:endParaRPr lang="en-US"/>
           </a:p>
@@ -4657,7 +4657,7 @@
           <a:p>
             <a:fld id="{16242ECF-4EC5-4F6F-92F2-C9C58BEB3FE8}" type="datetimeFigureOut">
               <a:rPr lang="en-US" smtClean="0"/>
-              <a:t>2/15/2024</a:t>
+              <a:t>2/16/2024</a:t>
             </a:fld>
             <a:endParaRPr lang="en-US"/>
           </a:p>
@@ -4798,7 +4798,7 @@
           <a:p>
             <a:fld id="{16242ECF-4EC5-4F6F-92F2-C9C58BEB3FE8}" type="datetimeFigureOut">
               <a:rPr lang="en-US" smtClean="0"/>
-              <a:t>2/15/2024</a:t>
+              <a:t>2/16/2024</a:t>
             </a:fld>
             <a:endParaRPr lang="en-US"/>
           </a:p>
@@ -4911,7 +4911,7 @@
           <a:p>
             <a:fld id="{16242ECF-4EC5-4F6F-92F2-C9C58BEB3FE8}" type="datetimeFigureOut">
               <a:rPr lang="en-US" smtClean="0"/>
-              <a:t>2/15/2024</a:t>
+              <a:t>2/16/2024</a:t>
             </a:fld>
             <a:endParaRPr lang="en-US"/>
           </a:p>
@@ -5222,7 +5222,7 @@
           <a:p>
             <a:fld id="{16242ECF-4EC5-4F6F-92F2-C9C58BEB3FE8}" type="datetimeFigureOut">
               <a:rPr lang="en-US" smtClean="0"/>
-              <a:t>2/15/2024</a:t>
+              <a:t>2/16/2024</a:t>
             </a:fld>
             <a:endParaRPr lang="en-US"/>
           </a:p>
@@ -5510,7 +5510,7 @@
           <a:p>
             <a:fld id="{16242ECF-4EC5-4F6F-92F2-C9C58BEB3FE8}" type="datetimeFigureOut">
               <a:rPr lang="en-US" smtClean="0"/>
-              <a:t>2/15/2024</a:t>
+              <a:t>2/16/2024</a:t>
             </a:fld>
             <a:endParaRPr lang="en-US"/>
           </a:p>
@@ -5751,7 +5751,7 @@
           <a:p>
             <a:fld id="{16242ECF-4EC5-4F6F-92F2-C9C58BEB3FE8}" type="datetimeFigureOut">
               <a:rPr lang="en-US" smtClean="0"/>
-              <a:t>2/15/2024</a:t>
+              <a:t>2/16/2024</a:t>
             </a:fld>
             <a:endParaRPr lang="en-US"/>
           </a:p>
@@ -6198,14 +6198,14 @@
           <a:p>
             <a:r>
               <a:rPr lang="en-US" dirty="0"/>
-              <a:t>Lecture 11</a:t>
+              <a:t>Lecture 12</a:t>
             </a:r>
             <a:br>
-              <a:rPr lang="en-US" dirty="0"/>
+              <a:rPr lang="en-US"/>
             </a:br>
             <a:r>
-              <a:rPr lang="en-US" dirty="0"/>
-              <a:t>Introduction to probability</a:t>
+              <a:rPr lang="en-US"/>
+              <a:t>probability and random variables</a:t>
             </a:r>
             <a:br>
               <a:rPr lang="en-US" dirty="0"/>
@@ -8239,8 +8239,8 @@
           </a:p>
         </p:txBody>
       </p:sp>
-      <mc:AlternateContent xmlns:mc="http://schemas.openxmlformats.org/markup-compatibility/2006">
-        <mc:Choice xmlns:a14="http://schemas.microsoft.com/office/drawing/2010/main" Requires="a14">
+      <mc:AlternateContent xmlns:mc="http://schemas.openxmlformats.org/markup-compatibility/2006" xmlns:a14="http://schemas.microsoft.com/office/drawing/2010/main">
+        <mc:Choice Requires="a14">
           <p:sp>
             <p:nvSpPr>
               <p:cNvPr id="9" name="TextBox 8">
@@ -8309,7 +8309,7 @@
             </p:txBody>
           </p:sp>
         </mc:Choice>
-        <mc:Fallback>
+        <mc:Fallback xmlns="">
           <p:sp>
             <p:nvSpPr>
               <p:cNvPr id="9" name="TextBox 8">
@@ -8424,8 +8424,8 @@
           </a:p>
         </p:txBody>
       </p:sp>
-      <mc:AlternateContent xmlns:mc="http://schemas.openxmlformats.org/markup-compatibility/2006">
-        <mc:Choice xmlns:a14="http://schemas.microsoft.com/office/drawing/2010/main" Requires="a14">
+      <mc:AlternateContent xmlns:mc="http://schemas.openxmlformats.org/markup-compatibility/2006" xmlns:a14="http://schemas.microsoft.com/office/drawing/2010/main">
+        <mc:Choice Requires="a14">
           <p:graphicFrame>
             <p:nvGraphicFramePr>
               <p:cNvPr id="3" name="Table 2">
@@ -8694,7 +8694,7 @@
             </a:graphic>
           </p:graphicFrame>
         </mc:Choice>
-        <mc:Fallback>
+        <mc:Fallback xmlns="">
           <p:graphicFrame>
             <p:nvGraphicFramePr>
               <p:cNvPr id="3" name="Table 2">
@@ -8928,8 +8928,8 @@
           </p:graphicFrame>
         </mc:Fallback>
       </mc:AlternateContent>
-      <mc:AlternateContent xmlns:mc="http://schemas.openxmlformats.org/markup-compatibility/2006">
-        <mc:Choice xmlns:a14="http://schemas.microsoft.com/office/drawing/2010/main" Requires="a14">
+      <mc:AlternateContent xmlns:mc="http://schemas.openxmlformats.org/markup-compatibility/2006" xmlns:a14="http://schemas.microsoft.com/office/drawing/2010/main">
+        <mc:Choice Requires="a14">
           <p:graphicFrame>
             <p:nvGraphicFramePr>
               <p:cNvPr id="4" name="Table 3">
@@ -9401,7 +9401,7 @@
             </a:graphic>
           </p:graphicFrame>
         </mc:Choice>
-        <mc:Fallback>
+        <mc:Fallback xmlns="">
           <p:graphicFrame>
             <p:nvGraphicFramePr>
               <p:cNvPr id="4" name="Table 3">
@@ -9996,8 +9996,8 @@
           </a:p>
         </p:txBody>
       </p:sp>
-      <mc:AlternateContent xmlns:mc="http://schemas.openxmlformats.org/markup-compatibility/2006">
-        <mc:Choice xmlns:a14="http://schemas.microsoft.com/office/drawing/2010/main" Requires="a14">
+      <mc:AlternateContent xmlns:mc="http://schemas.openxmlformats.org/markup-compatibility/2006" xmlns:a14="http://schemas.microsoft.com/office/drawing/2010/main">
+        <mc:Choice Requires="a14">
           <p:sp>
             <p:nvSpPr>
               <p:cNvPr id="3" name="Content Placeholder 2">
@@ -10538,7 +10538,7 @@
             </p:txBody>
           </p:sp>
         </mc:Choice>
-        <mc:Fallback>
+        <mc:Fallback xmlns="">
           <p:sp>
             <p:nvSpPr>
               <p:cNvPr id="3" name="Content Placeholder 2">
@@ -11161,8 +11161,8 @@
           </a:p>
         </p:txBody>
       </p:sp>
-      <mc:AlternateContent xmlns:mc="http://schemas.openxmlformats.org/markup-compatibility/2006">
-        <mc:Choice xmlns:a14="http://schemas.microsoft.com/office/drawing/2010/main" Requires="a14">
+      <mc:AlternateContent xmlns:mc="http://schemas.openxmlformats.org/markup-compatibility/2006" xmlns:a14="http://schemas.microsoft.com/office/drawing/2010/main">
+        <mc:Choice Requires="a14">
           <p:sp>
             <p:nvSpPr>
               <p:cNvPr id="3" name="Content Placeholder 2">
@@ -11442,7 +11442,7 @@
             </p:txBody>
           </p:sp>
         </mc:Choice>
-        <mc:Fallback>
+        <mc:Fallback xmlns="">
           <p:sp>
             <p:nvSpPr>
               <p:cNvPr id="3" name="Content Placeholder 2">
@@ -12267,8 +12267,8 @@
           </a:p>
         </p:txBody>
       </p:sp>
-      <mc:AlternateContent xmlns:mc="http://schemas.openxmlformats.org/markup-compatibility/2006">
-        <mc:Choice xmlns:a14="http://schemas.microsoft.com/office/drawing/2010/main" Requires="a14">
+      <mc:AlternateContent xmlns:mc="http://schemas.openxmlformats.org/markup-compatibility/2006" xmlns:a14="http://schemas.microsoft.com/office/drawing/2010/main">
+        <mc:Choice Requires="a14">
           <p:sp>
             <p:nvSpPr>
               <p:cNvPr id="3" name="Content Placeholder 2">
@@ -12559,7 +12559,7 @@
             </p:txBody>
           </p:sp>
         </mc:Choice>
-        <mc:Fallback>
+        <mc:Fallback xmlns="">
           <p:sp>
             <p:nvSpPr>
               <p:cNvPr id="3" name="Content Placeholder 2">
@@ -12744,8 +12744,8 @@
           </a:p>
         </p:txBody>
       </p:sp>
-      <mc:AlternateContent xmlns:mc="http://schemas.openxmlformats.org/markup-compatibility/2006">
-        <mc:Choice xmlns:a14="http://schemas.microsoft.com/office/drawing/2010/main" Requires="a14">
+      <mc:AlternateContent xmlns:mc="http://schemas.openxmlformats.org/markup-compatibility/2006" xmlns:a14="http://schemas.microsoft.com/office/drawing/2010/main">
+        <mc:Choice Requires="a14">
           <p:sp>
             <p:nvSpPr>
               <p:cNvPr id="3" name="Content Placeholder 2">
@@ -12875,7 +12875,7 @@
             </p:txBody>
           </p:sp>
         </mc:Choice>
-        <mc:Fallback>
+        <mc:Fallback xmlns="">
           <p:sp>
             <p:nvSpPr>
               <p:cNvPr id="3" name="Content Placeholder 2">
@@ -14499,8 +14499,8 @@
           </a:p>
         </p:txBody>
       </p:sp>
-      <mc:AlternateContent xmlns:mc="http://schemas.openxmlformats.org/markup-compatibility/2006">
-        <mc:Choice xmlns:a14="http://schemas.microsoft.com/office/drawing/2010/main" Requires="a14">
+      <mc:AlternateContent xmlns:mc="http://schemas.openxmlformats.org/markup-compatibility/2006" xmlns:a14="http://schemas.microsoft.com/office/drawing/2010/main">
+        <mc:Choice Requires="a14">
           <p:sp>
             <p:nvSpPr>
               <p:cNvPr id="3" name="Content Placeholder 2">
@@ -14938,7 +14938,7 @@
             </p:txBody>
           </p:sp>
         </mc:Choice>
-        <mc:Fallback>
+        <mc:Fallback xmlns="">
           <p:sp>
             <p:nvSpPr>
               <p:cNvPr id="3" name="Content Placeholder 2">
@@ -15077,8 +15077,8 @@
           </a:p>
         </p:txBody>
       </p:sp>
-      <mc:AlternateContent xmlns:mc="http://schemas.openxmlformats.org/markup-compatibility/2006">
-        <mc:Choice xmlns:a14="http://schemas.microsoft.com/office/drawing/2010/main" Requires="a14">
+      <mc:AlternateContent xmlns:mc="http://schemas.openxmlformats.org/markup-compatibility/2006" xmlns:a14="http://schemas.microsoft.com/office/drawing/2010/main">
+        <mc:Choice Requires="a14">
           <p:sp>
             <p:nvSpPr>
               <p:cNvPr id="3" name="Content Placeholder 2">
@@ -15329,7 +15329,7 @@
             </p:txBody>
           </p:sp>
         </mc:Choice>
-        <mc:Fallback>
+        <mc:Fallback xmlns="">
           <p:sp>
             <p:nvSpPr>
               <p:cNvPr id="3" name="Content Placeholder 2">

</xml_diff>